<commit_message>
Adding a new template slide
</commit_message>
<xml_diff>
--- a/input/template.pptx
+++ b/input/template.pptx
@@ -219,7 +219,7 @@
           <a:p>
             <a:fld id="{AB138FA6-3D81-4FF4-A72E-4DAD97808285}" type="datetimeFigureOut">
               <a:rPr lang="en-GB" smtClean="0"/>
-              <a:t>13/06/2024</a:t>
+              <a:t>01/07/2024</a:t>
             </a:fld>
             <a:endParaRPr lang="en-GB"/>
           </a:p>
@@ -385,7 +385,7 @@
           <a:p>
             <a:fld id="{4057B71A-74EE-4B31-BF37-E9D49DD09248}" type="datetimeFigureOut">
               <a:rPr lang="en-GB" smtClean="0"/>
-              <a:t>13/06/2024</a:t>
+              <a:t>01/07/2024</a:t>
             </a:fld>
             <a:endParaRPr lang="en-GB"/>
           </a:p>
@@ -932,6 +932,451 @@
 
 <file path=ppt/slideLayouts/slideLayout10.xml><?xml version="1.0" encoding="utf-8"?>
 <p:sldLayout xmlns:a="http://schemas.openxmlformats.org/drawingml/2006/main" xmlns:r="http://schemas.openxmlformats.org/officeDocument/2006/relationships" xmlns:p="http://schemas.openxmlformats.org/presentationml/2006/main" preserve="1" userDrawn="1">
+  <p:cSld name="Analytics_two_content_upper_text">
+    <p:spTree>
+      <p:nvGrpSpPr>
+        <p:cNvPr id="1" name=""/>
+        <p:cNvGrpSpPr/>
+        <p:nvPr/>
+      </p:nvGrpSpPr>
+      <p:grpSpPr>
+        <a:xfrm>
+          <a:off x="0" y="0"/>
+          <a:ext cx="0" cy="0"/>
+          <a:chOff x="0" y="0"/>
+          <a:chExt cx="0" cy="0"/>
+        </a:xfrm>
+      </p:grpSpPr>
+      <p:pic>
+        <p:nvPicPr>
+          <p:cNvPr id="8" name="Graphic 7">
+            <a:extLst>
+              <a:ext uri="{FF2B5EF4-FFF2-40B4-BE49-F238E27FC236}">
+                <a16:creationId xmlns:a16="http://schemas.microsoft.com/office/drawing/2014/main" id="{881422D9-91D1-E71D-80F9-CD5BDC13C2CE}"/>
+              </a:ext>
+            </a:extLst>
+          </p:cNvPr>
+          <p:cNvPicPr>
+            <a:picLocks noChangeAspect="1"/>
+          </p:cNvPicPr>
+          <p:nvPr userDrawn="1"/>
+        </p:nvPicPr>
+        <p:blipFill rotWithShape="1">
+          <a:blip r:embed="rId2">
+            <a:extLst>
+              <a:ext uri="{28A0092B-C50C-407E-A947-70E740481C1C}">
+                <a14:useLocalDpi xmlns:a14="http://schemas.microsoft.com/office/drawing/2010/main" val="0"/>
+              </a:ext>
+              <a:ext uri="{96DAC541-7B7A-43D3-8B79-37D633B846F1}">
+                <asvg:svgBlip xmlns:asvg="http://schemas.microsoft.com/office/drawing/2016/SVG/main" r:embed="rId3"/>
+              </a:ext>
+            </a:extLst>
+          </a:blip>
+          <a:srcRect l="25632" t="56600" r="41278" b="23967"/>
+          <a:stretch/>
+        </p:blipFill>
+        <p:spPr>
+          <a:xfrm>
+            <a:off x="0" y="-1"/>
+            <a:ext cx="12192000" cy="6858001"/>
+          </a:xfrm>
+          <a:prstGeom prst="rect">
+            <a:avLst/>
+          </a:prstGeom>
+        </p:spPr>
+      </p:pic>
+      <p:sp>
+        <p:nvSpPr>
+          <p:cNvPr id="3" name="Title 1">
+            <a:extLst>
+              <a:ext uri="{FF2B5EF4-FFF2-40B4-BE49-F238E27FC236}">
+                <a16:creationId xmlns:a16="http://schemas.microsoft.com/office/drawing/2014/main" id="{73EA02D0-A6DE-7E81-08B3-78552A9F4F5B}"/>
+              </a:ext>
+            </a:extLst>
+          </p:cNvPr>
+          <p:cNvSpPr>
+            <a:spLocks noGrp="1"/>
+          </p:cNvSpPr>
+          <p:nvPr>
+            <p:ph type="title" hasCustomPrompt="1"/>
+          </p:nvPr>
+        </p:nvSpPr>
+        <p:spPr>
+          <a:xfrm>
+            <a:off x="838200" y="365125"/>
+            <a:ext cx="10515600" cy="575401"/>
+          </a:xfrm>
+          <a:prstGeom prst="rect">
+            <a:avLst/>
+          </a:prstGeom>
+        </p:spPr>
+        <p:txBody>
+          <a:bodyPr/>
+          <a:lstStyle>
+            <a:lvl1pPr>
+              <a:defRPr sz="3600" b="1">
+                <a:solidFill>
+                  <a:schemeClr val="tx2"/>
+                </a:solidFill>
+              </a:defRPr>
+            </a:lvl1pPr>
+          </a:lstStyle>
+          <a:p>
+            <a:r>
+              <a:rPr lang="en-GB" dirty="0"/>
+              <a:t>Slide Title</a:t>
+            </a:r>
+            <a:endParaRPr lang="en-US" dirty="0"/>
+          </a:p>
+        </p:txBody>
+      </p:sp>
+      <p:sp>
+        <p:nvSpPr>
+          <p:cNvPr id="4" name="Content Placeholder 2">
+            <a:extLst>
+              <a:ext uri="{FF2B5EF4-FFF2-40B4-BE49-F238E27FC236}">
+                <a16:creationId xmlns:a16="http://schemas.microsoft.com/office/drawing/2014/main" id="{68B958D0-0113-1843-565F-35A8D2149E49}"/>
+              </a:ext>
+            </a:extLst>
+          </p:cNvPr>
+          <p:cNvSpPr>
+            <a:spLocks noGrp="1"/>
+          </p:cNvSpPr>
+          <p:nvPr>
+            <p:ph sz="half" idx="1" hasCustomPrompt="1"/>
+          </p:nvPr>
+        </p:nvSpPr>
+        <p:spPr>
+          <a:xfrm>
+            <a:off x="838200" y="2215461"/>
+            <a:ext cx="5181600" cy="3961502"/>
+          </a:xfrm>
+          <a:prstGeom prst="rect">
+            <a:avLst/>
+          </a:prstGeom>
+        </p:spPr>
+        <p:txBody>
+          <a:bodyPr/>
+          <a:lstStyle>
+            <a:lvl1pPr>
+              <a:defRPr>
+                <a:solidFill>
+                  <a:schemeClr val="tx2"/>
+                </a:solidFill>
+              </a:defRPr>
+            </a:lvl1pPr>
+            <a:lvl2pPr>
+              <a:defRPr>
+                <a:solidFill>
+                  <a:schemeClr val="tx2"/>
+                </a:solidFill>
+              </a:defRPr>
+            </a:lvl2pPr>
+            <a:lvl3pPr>
+              <a:defRPr>
+                <a:solidFill>
+                  <a:schemeClr val="tx2"/>
+                </a:solidFill>
+              </a:defRPr>
+            </a:lvl3pPr>
+            <a:lvl4pPr>
+              <a:defRPr>
+                <a:solidFill>
+                  <a:schemeClr val="tx2"/>
+                </a:solidFill>
+              </a:defRPr>
+            </a:lvl4pPr>
+            <a:lvl5pPr>
+              <a:defRPr>
+                <a:solidFill>
+                  <a:schemeClr val="tx2"/>
+                </a:solidFill>
+              </a:defRPr>
+            </a:lvl5pPr>
+            <a:lvl6pPr>
+              <a:defRPr>
+                <a:solidFill>
+                  <a:schemeClr val="tx2"/>
+                </a:solidFill>
+              </a:defRPr>
+            </a:lvl6pPr>
+            <a:lvl7pPr>
+              <a:defRPr>
+                <a:solidFill>
+                  <a:schemeClr val="tx2"/>
+                </a:solidFill>
+              </a:defRPr>
+            </a:lvl7pPr>
+            <a:lvl8pPr>
+              <a:defRPr>
+                <a:solidFill>
+                  <a:schemeClr val="tx2"/>
+                </a:solidFill>
+              </a:defRPr>
+            </a:lvl8pPr>
+            <a:lvl9pPr>
+              <a:defRPr>
+                <a:solidFill>
+                  <a:schemeClr val="tx2"/>
+                </a:solidFill>
+              </a:defRPr>
+            </a:lvl9pPr>
+          </a:lstStyle>
+          <a:p>
+            <a:pPr lvl="0"/>
+            <a:r>
+              <a:rPr lang="en-GB" dirty="0"/>
+              <a:t>Content</a:t>
+            </a:r>
+          </a:p>
+        </p:txBody>
+      </p:sp>
+      <p:sp>
+        <p:nvSpPr>
+          <p:cNvPr id="5" name="Content Placeholder 3">
+            <a:extLst>
+              <a:ext uri="{FF2B5EF4-FFF2-40B4-BE49-F238E27FC236}">
+                <a16:creationId xmlns:a16="http://schemas.microsoft.com/office/drawing/2014/main" id="{69CDAA59-B375-BDC8-7795-39C02908256F}"/>
+              </a:ext>
+            </a:extLst>
+          </p:cNvPr>
+          <p:cNvSpPr>
+            <a:spLocks noGrp="1"/>
+          </p:cNvSpPr>
+          <p:nvPr>
+            <p:ph sz="half" idx="2" hasCustomPrompt="1"/>
+          </p:nvPr>
+        </p:nvSpPr>
+        <p:spPr>
+          <a:xfrm>
+            <a:off x="6172200" y="2215461"/>
+            <a:ext cx="5181600" cy="3961502"/>
+          </a:xfrm>
+          <a:prstGeom prst="rect">
+            <a:avLst/>
+          </a:prstGeom>
+        </p:spPr>
+        <p:txBody>
+          <a:bodyPr/>
+          <a:lstStyle>
+            <a:lvl1pPr>
+              <a:defRPr>
+                <a:solidFill>
+                  <a:schemeClr val="tx2"/>
+                </a:solidFill>
+              </a:defRPr>
+            </a:lvl1pPr>
+            <a:lvl2pPr>
+              <a:defRPr>
+                <a:solidFill>
+                  <a:schemeClr val="tx2"/>
+                </a:solidFill>
+              </a:defRPr>
+            </a:lvl2pPr>
+            <a:lvl3pPr>
+              <a:defRPr>
+                <a:solidFill>
+                  <a:schemeClr val="tx2"/>
+                </a:solidFill>
+              </a:defRPr>
+            </a:lvl3pPr>
+            <a:lvl4pPr>
+              <a:defRPr>
+                <a:solidFill>
+                  <a:schemeClr val="tx2"/>
+                </a:solidFill>
+              </a:defRPr>
+            </a:lvl4pPr>
+            <a:lvl5pPr>
+              <a:defRPr>
+                <a:solidFill>
+                  <a:schemeClr val="tx2"/>
+                </a:solidFill>
+              </a:defRPr>
+            </a:lvl5pPr>
+            <a:lvl6pPr>
+              <a:defRPr>
+                <a:solidFill>
+                  <a:schemeClr val="tx2"/>
+                </a:solidFill>
+              </a:defRPr>
+            </a:lvl6pPr>
+            <a:lvl7pPr>
+              <a:defRPr>
+                <a:solidFill>
+                  <a:schemeClr val="tx2"/>
+                </a:solidFill>
+              </a:defRPr>
+            </a:lvl7pPr>
+            <a:lvl8pPr>
+              <a:defRPr>
+                <a:solidFill>
+                  <a:schemeClr val="tx2"/>
+                </a:solidFill>
+              </a:defRPr>
+            </a:lvl8pPr>
+            <a:lvl9pPr>
+              <a:defRPr>
+                <a:solidFill>
+                  <a:schemeClr val="tx2"/>
+                </a:solidFill>
+              </a:defRPr>
+            </a:lvl9pPr>
+          </a:lstStyle>
+          <a:p>
+            <a:pPr lvl="0"/>
+            <a:r>
+              <a:rPr lang="en-GB" dirty="0"/>
+              <a:t>Content</a:t>
+            </a:r>
+          </a:p>
+        </p:txBody>
+      </p:sp>
+      <p:sp>
+        <p:nvSpPr>
+          <p:cNvPr id="6" name="Slide Number Placeholder 2">
+            <a:extLst>
+              <a:ext uri="{FF2B5EF4-FFF2-40B4-BE49-F238E27FC236}">
+                <a16:creationId xmlns:a16="http://schemas.microsoft.com/office/drawing/2014/main" id="{89C608F2-2B31-2EE5-CC3B-42FE54BFCF83}"/>
+              </a:ext>
+            </a:extLst>
+          </p:cNvPr>
+          <p:cNvSpPr>
+            <a:spLocks noGrp="1"/>
+          </p:cNvSpPr>
+          <p:nvPr>
+            <p:ph type="sldNum" sz="quarter" idx="11"/>
+          </p:nvPr>
+        </p:nvSpPr>
+        <p:spPr>
+          <a:xfrm>
+            <a:off x="9067800" y="6215034"/>
+            <a:ext cx="2743200" cy="365125"/>
+          </a:xfrm>
+          <a:prstGeom prst="rect">
+            <a:avLst/>
+          </a:prstGeom>
+        </p:spPr>
+        <p:txBody>
+          <a:bodyPr/>
+          <a:lstStyle>
+            <a:lvl1pPr algn="r">
+              <a:defRPr sz="1200">
+                <a:solidFill>
+                  <a:schemeClr val="tx1">
+                    <a:lumMod val="75000"/>
+                    <a:lumOff val="25000"/>
+                  </a:schemeClr>
+                </a:solidFill>
+              </a:defRPr>
+            </a:lvl1pPr>
+          </a:lstStyle>
+          <a:p>
+            <a:fld id="{D26BAAAC-E2E6-5240-A1E8-423BA9521B93}" type="slidenum">
+              <a:rPr lang="en-US" smtClean="0"/>
+              <a:pPr/>
+              <a:t>‹#›</a:t>
+            </a:fld>
+            <a:endParaRPr lang="en-US" dirty="0"/>
+          </a:p>
+        </p:txBody>
+      </p:sp>
+      <p:sp>
+        <p:nvSpPr>
+          <p:cNvPr id="7" name="Text Placeholder 6">
+            <a:extLst>
+              <a:ext uri="{FF2B5EF4-FFF2-40B4-BE49-F238E27FC236}">
+                <a16:creationId xmlns:a16="http://schemas.microsoft.com/office/drawing/2014/main" id="{99466875-1C80-1283-165A-8ED1A24254A9}"/>
+              </a:ext>
+            </a:extLst>
+          </p:cNvPr>
+          <p:cNvSpPr>
+            <a:spLocks noGrp="1"/>
+          </p:cNvSpPr>
+          <p:nvPr>
+            <p:ph type="body" sz="quarter" idx="12"/>
+          </p:nvPr>
+        </p:nvSpPr>
+        <p:spPr>
+          <a:xfrm>
+            <a:off x="838200" y="1008063"/>
+            <a:ext cx="10515600" cy="1119187"/>
+          </a:xfrm>
+          <a:prstGeom prst="rect">
+            <a:avLst/>
+          </a:prstGeom>
+        </p:spPr>
+        <p:txBody>
+          <a:bodyPr/>
+          <a:lstStyle>
+            <a:lvl1pPr>
+              <a:defRPr sz="1600"/>
+            </a:lvl1pPr>
+            <a:lvl2pPr>
+              <a:defRPr sz="1400"/>
+            </a:lvl2pPr>
+            <a:lvl3pPr>
+              <a:defRPr sz="1200"/>
+            </a:lvl3pPr>
+            <a:lvl4pPr>
+              <a:defRPr sz="1100"/>
+            </a:lvl4pPr>
+            <a:lvl5pPr>
+              <a:defRPr sz="1100"/>
+            </a:lvl5pPr>
+          </a:lstStyle>
+          <a:p>
+            <a:pPr lvl="0"/>
+            <a:r>
+              <a:rPr lang="en-GB" dirty="0"/>
+              <a:t>Click to edit Master text styles</a:t>
+            </a:r>
+          </a:p>
+          <a:p>
+            <a:pPr lvl="1"/>
+            <a:r>
+              <a:rPr lang="en-GB" dirty="0"/>
+              <a:t>Second level</a:t>
+            </a:r>
+          </a:p>
+          <a:p>
+            <a:pPr lvl="2"/>
+            <a:r>
+              <a:rPr lang="en-GB" dirty="0"/>
+              <a:t>Third level</a:t>
+            </a:r>
+          </a:p>
+          <a:p>
+            <a:pPr lvl="3"/>
+            <a:r>
+              <a:rPr lang="en-GB" dirty="0"/>
+              <a:t>Fourth level</a:t>
+            </a:r>
+          </a:p>
+          <a:p>
+            <a:pPr lvl="4"/>
+            <a:r>
+              <a:rPr lang="en-GB" dirty="0"/>
+              <a:t>Fifth level</a:t>
+            </a:r>
+          </a:p>
+        </p:txBody>
+      </p:sp>
+    </p:spTree>
+    <p:extLst>
+      <p:ext uri="{BB962C8B-B14F-4D97-AF65-F5344CB8AC3E}">
+        <p14:creationId xmlns:p14="http://schemas.microsoft.com/office/powerpoint/2010/main" val="1290471619"/>
+      </p:ext>
+    </p:extLst>
+  </p:cSld>
+  <p:clrMapOvr>
+    <a:masterClrMapping/>
+  </p:clrMapOvr>
+</p:sldLayout>
+</file>
+
+<file path=ppt/slideLayouts/slideLayout11.xml><?xml version="1.0" encoding="utf-8"?>
+<p:sldLayout xmlns:a="http://schemas.openxmlformats.org/drawingml/2006/main" xmlns:r="http://schemas.openxmlformats.org/officeDocument/2006/relationships" xmlns:p="http://schemas.openxmlformats.org/presentationml/2006/main" preserve="1" userDrawn="1">
   <p:cSld name="Image and Column Style 1">
     <p:spTree>
       <p:nvGrpSpPr>
@@ -1206,7 +1651,7 @@
 </p:sldLayout>
 </file>
 
-<file path=ppt/slideLayouts/slideLayout11.xml><?xml version="1.0" encoding="utf-8"?>
+<file path=ppt/slideLayouts/slideLayout12.xml><?xml version="1.0" encoding="utf-8"?>
 <p:sldLayout xmlns:a="http://schemas.openxmlformats.org/drawingml/2006/main" xmlns:r="http://schemas.openxmlformats.org/officeDocument/2006/relationships" xmlns:p="http://schemas.openxmlformats.org/presentationml/2006/main" preserve="1" userDrawn="1">
   <p:cSld name="Image and Column Style 2">
     <p:spTree>
@@ -1501,7 +1946,7 @@
 </p:sldLayout>
 </file>
 
-<file path=ppt/slideLayouts/slideLayout12.xml><?xml version="1.0" encoding="utf-8"?>
+<file path=ppt/slideLayouts/slideLayout13.xml><?xml version="1.0" encoding="utf-8"?>
 <p:sldLayout xmlns:a="http://schemas.openxmlformats.org/drawingml/2006/main" xmlns:r="http://schemas.openxmlformats.org/officeDocument/2006/relationships" xmlns:p="http://schemas.openxmlformats.org/presentationml/2006/main" preserve="1" userDrawn="1">
   <p:cSld name="Image Style 1">
     <p:spTree>
@@ -1662,7 +2107,7 @@
 </p:sldLayout>
 </file>
 
-<file path=ppt/slideLayouts/slideLayout13.xml><?xml version="1.0" encoding="utf-8"?>
+<file path=ppt/slideLayouts/slideLayout14.xml><?xml version="1.0" encoding="utf-8"?>
 <p:sldLayout xmlns:a="http://schemas.openxmlformats.org/drawingml/2006/main" xmlns:r="http://schemas.openxmlformats.org/officeDocument/2006/relationships" xmlns:p="http://schemas.openxmlformats.org/presentationml/2006/main" preserve="1" userDrawn="1">
   <p:cSld name="Image Style 2">
     <p:spTree>
@@ -1773,6 +2218,283 @@
     <p:extLst>
       <p:ext uri="{BB962C8B-B14F-4D97-AF65-F5344CB8AC3E}">
         <p14:creationId xmlns:p14="http://schemas.microsoft.com/office/powerpoint/2010/main" val="2140433845"/>
+      </p:ext>
+    </p:extLst>
+  </p:cSld>
+  <p:clrMapOvr>
+    <a:masterClrMapping/>
+  </p:clrMapOvr>
+</p:sldLayout>
+</file>
+
+<file path=ppt/slideLayouts/slideLayout15.xml><?xml version="1.0" encoding="utf-8"?>
+<p:sldLayout xmlns:a="http://schemas.openxmlformats.org/drawingml/2006/main" xmlns:r="http://schemas.openxmlformats.org/officeDocument/2006/relationships" xmlns:p="http://schemas.openxmlformats.org/presentationml/2006/main" preserve="1" userDrawn="1">
+  <p:cSld name="Analytics_slide_text_top">
+    <p:spTree>
+      <p:nvGrpSpPr>
+        <p:cNvPr id="1" name=""/>
+        <p:cNvGrpSpPr/>
+        <p:nvPr/>
+      </p:nvGrpSpPr>
+      <p:grpSpPr>
+        <a:xfrm>
+          <a:off x="0" y="0"/>
+          <a:ext cx="0" cy="0"/>
+          <a:chOff x="0" y="0"/>
+          <a:chExt cx="0" cy="0"/>
+        </a:xfrm>
+      </p:grpSpPr>
+      <p:sp>
+        <p:nvSpPr>
+          <p:cNvPr id="2" name="Title 1">
+            <a:extLst>
+              <a:ext uri="{FF2B5EF4-FFF2-40B4-BE49-F238E27FC236}">
+                <a16:creationId xmlns:a16="http://schemas.microsoft.com/office/drawing/2014/main" id="{E6DC95E3-EB62-1D87-E371-261D14FA08B4}"/>
+              </a:ext>
+            </a:extLst>
+          </p:cNvPr>
+          <p:cNvSpPr>
+            <a:spLocks noGrp="1"/>
+          </p:cNvSpPr>
+          <p:nvPr>
+            <p:ph type="title"/>
+          </p:nvPr>
+        </p:nvSpPr>
+        <p:spPr>
+          <a:xfrm>
+            <a:off x="838200" y="365125"/>
+            <a:ext cx="10515600" cy="1325563"/>
+          </a:xfrm>
+          <a:prstGeom prst="rect">
+            <a:avLst/>
+          </a:prstGeom>
+        </p:spPr>
+        <p:txBody>
+          <a:bodyPr/>
+          <a:lstStyle/>
+          <a:p>
+            <a:r>
+              <a:rPr lang="en-GB"/>
+              <a:t>Click to edit Master title style</a:t>
+            </a:r>
+          </a:p>
+        </p:txBody>
+      </p:sp>
+      <p:sp>
+        <p:nvSpPr>
+          <p:cNvPr id="4" name="Text Placeholder 3">
+            <a:extLst>
+              <a:ext uri="{FF2B5EF4-FFF2-40B4-BE49-F238E27FC236}">
+                <a16:creationId xmlns:a16="http://schemas.microsoft.com/office/drawing/2014/main" id="{16D08E33-10E0-1A7B-D3A2-76FD94A86154}"/>
+              </a:ext>
+            </a:extLst>
+          </p:cNvPr>
+          <p:cNvSpPr>
+            <a:spLocks noGrp="1"/>
+          </p:cNvSpPr>
+          <p:nvPr>
+            <p:ph type="body" sz="quarter" idx="10"/>
+          </p:nvPr>
+        </p:nvSpPr>
+        <p:spPr>
+          <a:xfrm>
+            <a:off x="838200" y="1766888"/>
+            <a:ext cx="10515600" cy="736600"/>
+          </a:xfrm>
+          <a:prstGeom prst="rect">
+            <a:avLst/>
+          </a:prstGeom>
+        </p:spPr>
+        <p:txBody>
+          <a:bodyPr/>
+          <a:lstStyle>
+            <a:lvl1pPr>
+              <a:defRPr sz="1600"/>
+            </a:lvl1pPr>
+            <a:lvl2pPr>
+              <a:defRPr sz="1400"/>
+            </a:lvl2pPr>
+            <a:lvl3pPr>
+              <a:defRPr sz="1200"/>
+            </a:lvl3pPr>
+            <a:lvl4pPr>
+              <a:defRPr sz="1100"/>
+            </a:lvl4pPr>
+            <a:lvl5pPr>
+              <a:defRPr sz="1100"/>
+            </a:lvl5pPr>
+          </a:lstStyle>
+          <a:p>
+            <a:pPr lvl="0"/>
+            <a:r>
+              <a:rPr lang="en-GB" dirty="0"/>
+              <a:t>Click to edit Master text styles</a:t>
+            </a:r>
+          </a:p>
+          <a:p>
+            <a:pPr lvl="1"/>
+            <a:r>
+              <a:rPr lang="en-GB" dirty="0"/>
+              <a:t>Second level</a:t>
+            </a:r>
+          </a:p>
+          <a:p>
+            <a:pPr lvl="2"/>
+            <a:r>
+              <a:rPr lang="en-GB" dirty="0"/>
+              <a:t>Third level</a:t>
+            </a:r>
+          </a:p>
+          <a:p>
+            <a:pPr lvl="3"/>
+            <a:r>
+              <a:rPr lang="en-GB" dirty="0"/>
+              <a:t>Fourth level</a:t>
+            </a:r>
+          </a:p>
+          <a:p>
+            <a:pPr lvl="4"/>
+            <a:r>
+              <a:rPr lang="en-GB" dirty="0"/>
+              <a:t>Fifth level</a:t>
+            </a:r>
+          </a:p>
+        </p:txBody>
+      </p:sp>
+      <p:sp>
+        <p:nvSpPr>
+          <p:cNvPr id="8" name="Content Placeholder 7">
+            <a:extLst>
+              <a:ext uri="{FF2B5EF4-FFF2-40B4-BE49-F238E27FC236}">
+                <a16:creationId xmlns:a16="http://schemas.microsoft.com/office/drawing/2014/main" id="{96408C25-F44D-A071-E6EA-EFDBAC5F3EE2}"/>
+              </a:ext>
+            </a:extLst>
+          </p:cNvPr>
+          <p:cNvSpPr>
+            <a:spLocks noGrp="1"/>
+          </p:cNvSpPr>
+          <p:nvPr>
+            <p:ph sz="quarter" idx="12"/>
+          </p:nvPr>
+        </p:nvSpPr>
+        <p:spPr>
+          <a:xfrm>
+            <a:off x="5857875" y="2579688"/>
+            <a:ext cx="5495925" cy="3825875"/>
+          </a:xfrm>
+          <a:prstGeom prst="rect">
+            <a:avLst/>
+          </a:prstGeom>
+        </p:spPr>
+        <p:txBody>
+          <a:bodyPr/>
+          <a:lstStyle/>
+          <a:p>
+            <a:pPr lvl="0"/>
+            <a:r>
+              <a:rPr lang="en-GB"/>
+              <a:t>Click to edit Master text styles</a:t>
+            </a:r>
+          </a:p>
+          <a:p>
+            <a:pPr lvl="1"/>
+            <a:r>
+              <a:rPr lang="en-GB"/>
+              <a:t>Second level</a:t>
+            </a:r>
+          </a:p>
+          <a:p>
+            <a:pPr lvl="2"/>
+            <a:r>
+              <a:rPr lang="en-GB"/>
+              <a:t>Third level</a:t>
+            </a:r>
+          </a:p>
+          <a:p>
+            <a:pPr lvl="3"/>
+            <a:r>
+              <a:rPr lang="en-GB"/>
+              <a:t>Fourth level</a:t>
+            </a:r>
+          </a:p>
+          <a:p>
+            <a:pPr lvl="4"/>
+            <a:r>
+              <a:rPr lang="en-GB"/>
+              <a:t>Fifth level</a:t>
+            </a:r>
+          </a:p>
+        </p:txBody>
+      </p:sp>
+      <p:sp>
+        <p:nvSpPr>
+          <p:cNvPr id="10" name="Content Placeholder 9">
+            <a:extLst>
+              <a:ext uri="{FF2B5EF4-FFF2-40B4-BE49-F238E27FC236}">
+                <a16:creationId xmlns:a16="http://schemas.microsoft.com/office/drawing/2014/main" id="{4EAAA847-9C7B-F993-4560-F0FEA89103B9}"/>
+              </a:ext>
+            </a:extLst>
+          </p:cNvPr>
+          <p:cNvSpPr>
+            <a:spLocks noGrp="1"/>
+          </p:cNvSpPr>
+          <p:nvPr>
+            <p:ph sz="quarter" idx="13"/>
+          </p:nvPr>
+        </p:nvSpPr>
+        <p:spPr>
+          <a:xfrm>
+            <a:off x="838200" y="2579688"/>
+            <a:ext cx="4903788" cy="3825875"/>
+          </a:xfrm>
+          <a:prstGeom prst="rect">
+            <a:avLst/>
+          </a:prstGeom>
+        </p:spPr>
+        <p:txBody>
+          <a:bodyPr/>
+          <a:lstStyle/>
+          <a:p>
+            <a:pPr lvl="0"/>
+            <a:r>
+              <a:rPr lang="en-GB"/>
+              <a:t>Click to edit Master text styles</a:t>
+            </a:r>
+          </a:p>
+          <a:p>
+            <a:pPr lvl="1"/>
+            <a:r>
+              <a:rPr lang="en-GB"/>
+              <a:t>Second level</a:t>
+            </a:r>
+          </a:p>
+          <a:p>
+            <a:pPr lvl="2"/>
+            <a:r>
+              <a:rPr lang="en-GB"/>
+              <a:t>Third level</a:t>
+            </a:r>
+          </a:p>
+          <a:p>
+            <a:pPr lvl="3"/>
+            <a:r>
+              <a:rPr lang="en-GB"/>
+              <a:t>Fourth level</a:t>
+            </a:r>
+          </a:p>
+          <a:p>
+            <a:pPr lvl="4"/>
+            <a:r>
+              <a:rPr lang="en-GB"/>
+              <a:t>Fifth level</a:t>
+            </a:r>
+          </a:p>
+        </p:txBody>
+      </p:sp>
+    </p:spTree>
+    <p:extLst>
+      <p:ext uri="{BB962C8B-B14F-4D97-AF65-F5344CB8AC3E}">
+        <p14:creationId xmlns:p14="http://schemas.microsoft.com/office/powerpoint/2010/main" val="223529202"/>
       </p:ext>
     </p:extLst>
   </p:cSld>
@@ -4633,13 +5355,13 @@
           <p:nvPr userDrawn="1"/>
         </p:nvPicPr>
         <p:blipFill>
-          <a:blip r:embed="rId9" cstate="print">
+          <a:blip r:embed="rId11" cstate="print">
             <a:extLst>
               <a:ext uri="{28A0092B-C50C-407E-A947-70E740481C1C}">
                 <a14:useLocalDpi xmlns:a14="http://schemas.microsoft.com/office/drawing/2010/main" val="0"/>
               </a:ext>
               <a:ext uri="{96DAC541-7B7A-43D3-8B79-37D633B846F1}">
-                <asvg:svgBlip xmlns:asvg="http://schemas.microsoft.com/office/drawing/2016/SVG/main" r:embed="rId10"/>
+                <asvg:svgBlip xmlns:asvg="http://schemas.microsoft.com/office/drawing/2016/SVG/main" r:embed="rId12"/>
               </a:ext>
             </a:extLst>
           </a:blip>
@@ -4669,10 +5391,12 @@
     <p:sldLayoutId id="2147483977" r:id="rId1"/>
     <p:sldLayoutId id="2147483978" r:id="rId2"/>
     <p:sldLayoutId id="2147483979" r:id="rId3"/>
-    <p:sldLayoutId id="2147483980" r:id="rId4"/>
-    <p:sldLayoutId id="2147483981" r:id="rId5"/>
-    <p:sldLayoutId id="2147483982" r:id="rId6"/>
-    <p:sldLayoutId id="2147483983" r:id="rId7"/>
+    <p:sldLayoutId id="2147483985" r:id="rId4"/>
+    <p:sldLayoutId id="2147483980" r:id="rId5"/>
+    <p:sldLayoutId id="2147483981" r:id="rId6"/>
+    <p:sldLayoutId id="2147483982" r:id="rId7"/>
+    <p:sldLayoutId id="2147483983" r:id="rId8"/>
+    <p:sldLayoutId id="2147483984" r:id="rId9"/>
   </p:sldLayoutIdLst>
   <p:hf hdr="0" ftr="0" dt="0"/>
   <p:txStyles>

</xml_diff>

<commit_message>
Added code fore new table
</commit_message>
<xml_diff>
--- a/input/template.pptx
+++ b/input/template.pptx
@@ -219,7 +219,7 @@
           <a:p>
             <a:fld id="{AB138FA6-3D81-4FF4-A72E-4DAD97808285}" type="datetimeFigureOut">
               <a:rPr lang="en-GB" smtClean="0"/>
-              <a:t>01/07/2024</a:t>
+              <a:t>06/08/2024</a:t>
             </a:fld>
             <a:endParaRPr lang="en-GB"/>
           </a:p>
@@ -385,7 +385,7 @@
           <a:p>
             <a:fld id="{4057B71A-74EE-4B31-BF37-E9D49DD09248}" type="datetimeFigureOut">
               <a:rPr lang="en-GB" smtClean="0"/>
-              <a:t>01/07/2024</a:t>
+              <a:t>06/08/2024</a:t>
             </a:fld>
             <a:endParaRPr lang="en-GB"/>
           </a:p>
@@ -2271,7 +2271,15 @@
         </p:spPr>
         <p:txBody>
           <a:bodyPr/>
-          <a:lstStyle/>
+          <a:lstStyle>
+            <a:lvl1pPr>
+              <a:defRPr b="1">
+                <a:solidFill>
+                  <a:schemeClr val="tx2"/>
+                </a:solidFill>
+              </a:defRPr>
+            </a:lvl1pPr>
+          </a:lstStyle>
           <a:p>
             <a:r>
               <a:rPr lang="en-GB"/>
@@ -2495,6 +2503,147 @@
     <p:extLst>
       <p:ext uri="{BB962C8B-B14F-4D97-AF65-F5344CB8AC3E}">
         <p14:creationId xmlns:p14="http://schemas.microsoft.com/office/powerpoint/2010/main" val="223529202"/>
+      </p:ext>
+    </p:extLst>
+  </p:cSld>
+  <p:clrMapOvr>
+    <a:masterClrMapping/>
+  </p:clrMapOvr>
+</p:sldLayout>
+</file>
+
+<file path=ppt/slideLayouts/slideLayout16.xml><?xml version="1.0" encoding="utf-8"?>
+<p:sldLayout xmlns:a="http://schemas.openxmlformats.org/drawingml/2006/main" xmlns:r="http://schemas.openxmlformats.org/officeDocument/2006/relationships" xmlns:p="http://schemas.openxmlformats.org/presentationml/2006/main" preserve="1" userDrawn="1">
+  <p:cSld name="Analytics_Text_Slide_Single">
+    <p:spTree>
+      <p:nvGrpSpPr>
+        <p:cNvPr id="1" name=""/>
+        <p:cNvGrpSpPr/>
+        <p:nvPr/>
+      </p:nvGrpSpPr>
+      <p:grpSpPr>
+        <a:xfrm>
+          <a:off x="0" y="0"/>
+          <a:ext cx="0" cy="0"/>
+          <a:chOff x="0" y="0"/>
+          <a:chExt cx="0" cy="0"/>
+        </a:xfrm>
+      </p:grpSpPr>
+      <p:sp>
+        <p:nvSpPr>
+          <p:cNvPr id="2" name="Title 1">
+            <a:extLst>
+              <a:ext uri="{FF2B5EF4-FFF2-40B4-BE49-F238E27FC236}">
+                <a16:creationId xmlns:a16="http://schemas.microsoft.com/office/drawing/2014/main" id="{2B85A56D-7968-086A-B0B5-AE120A27EFF8}"/>
+              </a:ext>
+            </a:extLst>
+          </p:cNvPr>
+          <p:cNvSpPr>
+            <a:spLocks noGrp="1"/>
+          </p:cNvSpPr>
+          <p:nvPr>
+            <p:ph type="title"/>
+          </p:nvPr>
+        </p:nvSpPr>
+        <p:spPr>
+          <a:xfrm>
+            <a:off x="480646" y="387107"/>
+            <a:ext cx="8610600" cy="766152"/>
+          </a:xfrm>
+          <a:prstGeom prst="rect">
+            <a:avLst/>
+          </a:prstGeom>
+        </p:spPr>
+        <p:txBody>
+          <a:bodyPr/>
+          <a:lstStyle>
+            <a:lvl1pPr>
+              <a:defRPr b="1">
+                <a:solidFill>
+                  <a:schemeClr val="tx2"/>
+                </a:solidFill>
+              </a:defRPr>
+            </a:lvl1pPr>
+          </a:lstStyle>
+          <a:p>
+            <a:r>
+              <a:rPr lang="en-US"/>
+              <a:t>Click to edit Master title style</a:t>
+            </a:r>
+            <a:endParaRPr lang="en-GB"/>
+          </a:p>
+        </p:txBody>
+      </p:sp>
+      <p:sp>
+        <p:nvSpPr>
+          <p:cNvPr id="4" name="Text Placeholder 3">
+            <a:extLst>
+              <a:ext uri="{FF2B5EF4-FFF2-40B4-BE49-F238E27FC236}">
+                <a16:creationId xmlns:a16="http://schemas.microsoft.com/office/drawing/2014/main" id="{C3CF9A5F-7B6E-93D1-CF27-6A283F4890B1}"/>
+              </a:ext>
+            </a:extLst>
+          </p:cNvPr>
+          <p:cNvSpPr>
+            <a:spLocks noGrp="1"/>
+          </p:cNvSpPr>
+          <p:nvPr>
+            <p:ph type="body" sz="quarter" idx="10"/>
+          </p:nvPr>
+        </p:nvSpPr>
+        <p:spPr>
+          <a:xfrm>
+            <a:off x="480646" y="1647825"/>
+            <a:ext cx="8610600" cy="4665663"/>
+          </a:xfrm>
+          <a:prstGeom prst="rect">
+            <a:avLst/>
+          </a:prstGeom>
+        </p:spPr>
+        <p:txBody>
+          <a:bodyPr/>
+          <a:lstStyle/>
+          <a:p>
+            <a:pPr lvl="0"/>
+            <a:r>
+              <a:rPr lang="en-US"/>
+              <a:t>Click to edit Master text styles</a:t>
+            </a:r>
+          </a:p>
+          <a:p>
+            <a:pPr lvl="1"/>
+            <a:r>
+              <a:rPr lang="en-US"/>
+              <a:t>Second level</a:t>
+            </a:r>
+          </a:p>
+          <a:p>
+            <a:pPr lvl="2"/>
+            <a:r>
+              <a:rPr lang="en-US"/>
+              <a:t>Third level</a:t>
+            </a:r>
+          </a:p>
+          <a:p>
+            <a:pPr lvl="3"/>
+            <a:r>
+              <a:rPr lang="en-US"/>
+              <a:t>Fourth level</a:t>
+            </a:r>
+          </a:p>
+          <a:p>
+            <a:pPr lvl="4"/>
+            <a:r>
+              <a:rPr lang="en-US"/>
+              <a:t>Fifth level</a:t>
+            </a:r>
+            <a:endParaRPr lang="en-GB"/>
+          </a:p>
+        </p:txBody>
+      </p:sp>
+    </p:spTree>
+    <p:extLst>
+      <p:ext uri="{BB962C8B-B14F-4D97-AF65-F5344CB8AC3E}">
+        <p14:creationId xmlns:p14="http://schemas.microsoft.com/office/powerpoint/2010/main" val="4011362004"/>
       </p:ext>
     </p:extLst>
   </p:cSld>
@@ -5355,13 +5504,13 @@
           <p:nvPr userDrawn="1"/>
         </p:nvPicPr>
         <p:blipFill>
-          <a:blip r:embed="rId11" cstate="print">
+          <a:blip r:embed="rId12" cstate="print">
             <a:extLst>
               <a:ext uri="{28A0092B-C50C-407E-A947-70E740481C1C}">
                 <a14:useLocalDpi xmlns:a14="http://schemas.microsoft.com/office/drawing/2010/main" val="0"/>
               </a:ext>
               <a:ext uri="{96DAC541-7B7A-43D3-8B79-37D633B846F1}">
-                <asvg:svgBlip xmlns:asvg="http://schemas.microsoft.com/office/drawing/2016/SVG/main" r:embed="rId12"/>
+                <asvg:svgBlip xmlns:asvg="http://schemas.microsoft.com/office/drawing/2016/SVG/main" r:embed="rId13"/>
               </a:ext>
             </a:extLst>
           </a:blip>
@@ -5397,6 +5546,7 @@
     <p:sldLayoutId id="2147483982" r:id="rId7"/>
     <p:sldLayoutId id="2147483983" r:id="rId8"/>
     <p:sldLayoutId id="2147483984" r:id="rId9"/>
+    <p:sldLayoutId id="2147483986" r:id="rId10"/>
   </p:sldLayoutIdLst>
   <p:hf hdr="0" ftr="0" dt="0"/>
   <p:txStyles>

</xml_diff>

<commit_message>
Changed the ppt template
</commit_message>
<xml_diff>
--- a/input/template.pptx
+++ b/input/template.pptx
@@ -219,7 +219,7 @@
           <a:p>
             <a:fld id="{AB138FA6-3D81-4FF4-A72E-4DAD97808285}" type="datetimeFigureOut">
               <a:rPr lang="en-GB" smtClean="0"/>
-              <a:t>06/08/2024</a:t>
+              <a:t>07/08/2024</a:t>
             </a:fld>
             <a:endParaRPr lang="en-GB"/>
           </a:p>
@@ -385,7 +385,7 @@
           <a:p>
             <a:fld id="{4057B71A-74EE-4B31-BF37-E9D49DD09248}" type="datetimeFigureOut">
               <a:rPr lang="en-GB" smtClean="0"/>
-              <a:t>06/08/2024</a:t>
+              <a:t>07/08/2024</a:t>
             </a:fld>
             <a:endParaRPr lang="en-GB"/>
           </a:p>
@@ -2644,6 +2644,271 @@
     <p:extLst>
       <p:ext uri="{BB962C8B-B14F-4D97-AF65-F5344CB8AC3E}">
         <p14:creationId xmlns:p14="http://schemas.microsoft.com/office/powerpoint/2010/main" val="4011362004"/>
+      </p:ext>
+    </p:extLst>
+  </p:cSld>
+  <p:clrMapOvr>
+    <a:masterClrMapping/>
+  </p:clrMapOvr>
+</p:sldLayout>
+</file>
+
+<file path=ppt/slideLayouts/slideLayout17.xml><?xml version="1.0" encoding="utf-8"?>
+<p:sldLayout xmlns:a="http://schemas.openxmlformats.org/drawingml/2006/main" xmlns:r="http://schemas.openxmlformats.org/officeDocument/2006/relationships" xmlns:p="http://schemas.openxmlformats.org/presentationml/2006/main" preserve="1" userDrawn="1">
+  <p:cSld name="Analytics_3Chart_Table">
+    <p:spTree>
+      <p:nvGrpSpPr>
+        <p:cNvPr id="1" name=""/>
+        <p:cNvGrpSpPr/>
+        <p:nvPr/>
+      </p:nvGrpSpPr>
+      <p:grpSpPr>
+        <a:xfrm>
+          <a:off x="0" y="0"/>
+          <a:ext cx="0" cy="0"/>
+          <a:chOff x="0" y="0"/>
+          <a:chExt cx="0" cy="0"/>
+        </a:xfrm>
+      </p:grpSpPr>
+      <p:sp>
+        <p:nvSpPr>
+          <p:cNvPr id="2" name="Title 1">
+            <a:extLst>
+              <a:ext uri="{FF2B5EF4-FFF2-40B4-BE49-F238E27FC236}">
+                <a16:creationId xmlns:a16="http://schemas.microsoft.com/office/drawing/2014/main" id="{611B0FA3-9CA7-1163-5522-F47327ED73D6}"/>
+              </a:ext>
+            </a:extLst>
+          </p:cNvPr>
+          <p:cNvSpPr>
+            <a:spLocks noGrp="1"/>
+          </p:cNvSpPr>
+          <p:nvPr>
+            <p:ph type="title"/>
+          </p:nvPr>
+        </p:nvSpPr>
+        <p:spPr>
+          <a:xfrm>
+            <a:off x="838200" y="365126"/>
+            <a:ext cx="8575431" cy="1299552"/>
+          </a:xfrm>
+          <a:prstGeom prst="rect">
+            <a:avLst/>
+          </a:prstGeom>
+        </p:spPr>
+        <p:txBody>
+          <a:bodyPr/>
+          <a:lstStyle/>
+          <a:p>
+            <a:r>
+              <a:rPr lang="en-US"/>
+              <a:t>Click to edit Master title style</a:t>
+            </a:r>
+            <a:endParaRPr lang="en-GB"/>
+          </a:p>
+        </p:txBody>
+      </p:sp>
+      <p:sp>
+        <p:nvSpPr>
+          <p:cNvPr id="4" name="Text Placeholder 3">
+            <a:extLst>
+              <a:ext uri="{FF2B5EF4-FFF2-40B4-BE49-F238E27FC236}">
+                <a16:creationId xmlns:a16="http://schemas.microsoft.com/office/drawing/2014/main" id="{2075185D-2457-A4AA-D252-A2662C27A125}"/>
+              </a:ext>
+            </a:extLst>
+          </p:cNvPr>
+          <p:cNvSpPr>
+            <a:spLocks noGrp="1"/>
+          </p:cNvSpPr>
+          <p:nvPr>
+            <p:ph type="body" sz="quarter" idx="10"/>
+          </p:nvPr>
+        </p:nvSpPr>
+        <p:spPr>
+          <a:xfrm>
+            <a:off x="838200" y="1811338"/>
+            <a:ext cx="9952892" cy="1201737"/>
+          </a:xfrm>
+          <a:prstGeom prst="rect">
+            <a:avLst/>
+          </a:prstGeom>
+        </p:spPr>
+        <p:txBody>
+          <a:bodyPr/>
+          <a:lstStyle/>
+          <a:p>
+            <a:pPr lvl="0"/>
+            <a:r>
+              <a:rPr lang="en-US"/>
+              <a:t>Click to edit Master text styles</a:t>
+            </a:r>
+          </a:p>
+          <a:p>
+            <a:pPr lvl="1"/>
+            <a:r>
+              <a:rPr lang="en-US"/>
+              <a:t>Second level</a:t>
+            </a:r>
+          </a:p>
+          <a:p>
+            <a:pPr lvl="2"/>
+            <a:r>
+              <a:rPr lang="en-US"/>
+              <a:t>Third level</a:t>
+            </a:r>
+          </a:p>
+          <a:p>
+            <a:pPr lvl="3"/>
+            <a:r>
+              <a:rPr lang="en-US"/>
+              <a:t>Fourth level</a:t>
+            </a:r>
+          </a:p>
+          <a:p>
+            <a:pPr lvl="4"/>
+            <a:r>
+              <a:rPr lang="en-US"/>
+              <a:t>Fifth level</a:t>
+            </a:r>
+            <a:endParaRPr lang="en-GB"/>
+          </a:p>
+        </p:txBody>
+      </p:sp>
+      <p:sp>
+        <p:nvSpPr>
+          <p:cNvPr id="6" name="Picture Placeholder 5">
+            <a:extLst>
+              <a:ext uri="{FF2B5EF4-FFF2-40B4-BE49-F238E27FC236}">
+                <a16:creationId xmlns:a16="http://schemas.microsoft.com/office/drawing/2014/main" id="{13D76448-9939-3D11-FE62-F2E50407D6E4}"/>
+              </a:ext>
+            </a:extLst>
+          </p:cNvPr>
+          <p:cNvSpPr>
+            <a:spLocks noGrp="1"/>
+          </p:cNvSpPr>
+          <p:nvPr>
+            <p:ph type="pic" sz="quarter" idx="11"/>
+          </p:nvPr>
+        </p:nvSpPr>
+        <p:spPr>
+          <a:xfrm>
+            <a:off x="838200" y="3030172"/>
+            <a:ext cx="9953625" cy="1284653"/>
+          </a:xfrm>
+          <a:prstGeom prst="rect">
+            <a:avLst/>
+          </a:prstGeom>
+        </p:spPr>
+        <p:txBody>
+          <a:bodyPr/>
+          <a:lstStyle/>
+          <a:p>
+            <a:endParaRPr lang="en-GB"/>
+          </a:p>
+        </p:txBody>
+      </p:sp>
+      <p:sp>
+        <p:nvSpPr>
+          <p:cNvPr id="8" name="Picture Placeholder 7">
+            <a:extLst>
+              <a:ext uri="{FF2B5EF4-FFF2-40B4-BE49-F238E27FC236}">
+                <a16:creationId xmlns:a16="http://schemas.microsoft.com/office/drawing/2014/main" id="{507CC9C2-E352-4017-16FC-B211ED015265}"/>
+              </a:ext>
+            </a:extLst>
+          </p:cNvPr>
+          <p:cNvSpPr>
+            <a:spLocks noGrp="1"/>
+          </p:cNvSpPr>
+          <p:nvPr>
+            <p:ph type="pic" sz="quarter" idx="12"/>
+          </p:nvPr>
+        </p:nvSpPr>
+        <p:spPr>
+          <a:xfrm>
+            <a:off x="4128482" y="4378569"/>
+            <a:ext cx="3363912" cy="2384670"/>
+          </a:xfrm>
+          <a:prstGeom prst="rect">
+            <a:avLst/>
+          </a:prstGeom>
+        </p:spPr>
+        <p:txBody>
+          <a:bodyPr/>
+          <a:lstStyle/>
+          <a:p>
+            <a:endParaRPr lang="en-GB"/>
+          </a:p>
+        </p:txBody>
+      </p:sp>
+      <p:sp>
+        <p:nvSpPr>
+          <p:cNvPr id="10" name="Picture Placeholder 9">
+            <a:extLst>
+              <a:ext uri="{FF2B5EF4-FFF2-40B4-BE49-F238E27FC236}">
+                <a16:creationId xmlns:a16="http://schemas.microsoft.com/office/drawing/2014/main" id="{2AB6A04C-8961-9540-81D4-6D6D40EA672A}"/>
+              </a:ext>
+            </a:extLst>
+          </p:cNvPr>
+          <p:cNvSpPr>
+            <a:spLocks noGrp="1"/>
+          </p:cNvSpPr>
+          <p:nvPr>
+            <p:ph type="pic" sz="quarter" idx="13"/>
+          </p:nvPr>
+        </p:nvSpPr>
+        <p:spPr>
+          <a:xfrm>
+            <a:off x="744298" y="4378569"/>
+            <a:ext cx="3363912" cy="2384670"/>
+          </a:xfrm>
+          <a:prstGeom prst="rect">
+            <a:avLst/>
+          </a:prstGeom>
+        </p:spPr>
+        <p:txBody>
+          <a:bodyPr/>
+          <a:lstStyle/>
+          <a:p>
+            <a:endParaRPr lang="en-GB"/>
+          </a:p>
+        </p:txBody>
+      </p:sp>
+      <p:sp>
+        <p:nvSpPr>
+          <p:cNvPr id="12" name="Picture Placeholder 11">
+            <a:extLst>
+              <a:ext uri="{FF2B5EF4-FFF2-40B4-BE49-F238E27FC236}">
+                <a16:creationId xmlns:a16="http://schemas.microsoft.com/office/drawing/2014/main" id="{A973F3DB-CA73-2399-40E5-E21BB71826E8}"/>
+              </a:ext>
+            </a:extLst>
+          </p:cNvPr>
+          <p:cNvSpPr>
+            <a:spLocks noGrp="1"/>
+          </p:cNvSpPr>
+          <p:nvPr>
+            <p:ph type="pic" sz="quarter" idx="14"/>
+          </p:nvPr>
+        </p:nvSpPr>
+        <p:spPr>
+          <a:xfrm>
+            <a:off x="7512666" y="4378935"/>
+            <a:ext cx="3363911" cy="2373313"/>
+          </a:xfrm>
+          <a:prstGeom prst="rect">
+            <a:avLst/>
+          </a:prstGeom>
+        </p:spPr>
+        <p:txBody>
+          <a:bodyPr/>
+          <a:lstStyle/>
+          <a:p>
+            <a:endParaRPr lang="en-GB"/>
+          </a:p>
+        </p:txBody>
+      </p:sp>
+    </p:spTree>
+    <p:extLst>
+      <p:ext uri="{BB962C8B-B14F-4D97-AF65-F5344CB8AC3E}">
+        <p14:creationId xmlns:p14="http://schemas.microsoft.com/office/powerpoint/2010/main" val="865130088"/>
       </p:ext>
     </p:extLst>
   </p:cSld>
@@ -5504,13 +5769,13 @@
           <p:nvPr userDrawn="1"/>
         </p:nvPicPr>
         <p:blipFill>
-          <a:blip r:embed="rId12" cstate="print">
+          <a:blip r:embed="rId13" cstate="print">
             <a:extLst>
               <a:ext uri="{28A0092B-C50C-407E-A947-70E740481C1C}">
                 <a14:useLocalDpi xmlns:a14="http://schemas.microsoft.com/office/drawing/2010/main" val="0"/>
               </a:ext>
               <a:ext uri="{96DAC541-7B7A-43D3-8B79-37D633B846F1}">
-                <asvg:svgBlip xmlns:asvg="http://schemas.microsoft.com/office/drawing/2016/SVG/main" r:embed="rId13"/>
+                <asvg:svgBlip xmlns:asvg="http://schemas.microsoft.com/office/drawing/2016/SVG/main" r:embed="rId14"/>
               </a:ext>
             </a:extLst>
           </a:blip>
@@ -5547,6 +5812,7 @@
     <p:sldLayoutId id="2147483983" r:id="rId8"/>
     <p:sldLayoutId id="2147483984" r:id="rId9"/>
     <p:sldLayoutId id="2147483986" r:id="rId10"/>
+    <p:sldLayoutId id="2147483987" r:id="rId11"/>
   </p:sldLayoutIdLst>
   <p:hf hdr="0" ftr="0" dt="0"/>
   <p:txStyles>

</xml_diff>

<commit_message>
added code for tables
</commit_message>
<xml_diff>
--- a/input/template.pptx
+++ b/input/template.pptx
@@ -2725,8 +2725,8 @@
         </p:nvSpPr>
         <p:spPr>
           <a:xfrm>
-            <a:off x="838200" y="1811338"/>
-            <a:ext cx="9952892" cy="1201737"/>
+            <a:off x="838200" y="1811339"/>
+            <a:ext cx="9952892" cy="785324"/>
           </a:xfrm>
           <a:prstGeom prst="rect">
             <a:avLst/>
@@ -2738,38 +2738,38 @@
           <a:p>
             <a:pPr lvl="0"/>
             <a:r>
-              <a:rPr lang="en-US"/>
+              <a:rPr lang="en-US" dirty="0"/>
               <a:t>Click to edit Master text styles</a:t>
             </a:r>
           </a:p>
           <a:p>
             <a:pPr lvl="1"/>
             <a:r>
-              <a:rPr lang="en-US"/>
+              <a:rPr lang="en-US" dirty="0"/>
               <a:t>Second level</a:t>
             </a:r>
           </a:p>
           <a:p>
             <a:pPr lvl="2"/>
             <a:r>
-              <a:rPr lang="en-US"/>
+              <a:rPr lang="en-US" dirty="0"/>
               <a:t>Third level</a:t>
             </a:r>
           </a:p>
           <a:p>
             <a:pPr lvl="3"/>
             <a:r>
-              <a:rPr lang="en-US"/>
+              <a:rPr lang="en-US" dirty="0"/>
               <a:t>Fourth level</a:t>
             </a:r>
           </a:p>
           <a:p>
             <a:pPr lvl="4"/>
             <a:r>
-              <a:rPr lang="en-US"/>
+              <a:rPr lang="en-US" dirty="0"/>
               <a:t>Fifth level</a:t>
             </a:r>
-            <a:endParaRPr lang="en-GB"/>
+            <a:endParaRPr lang="en-GB" dirty="0"/>
           </a:p>
         </p:txBody>
       </p:sp>
@@ -2791,8 +2791,8 @@
         </p:nvSpPr>
         <p:spPr>
           <a:xfrm>
-            <a:off x="838200" y="3030172"/>
-            <a:ext cx="9953625" cy="1284653"/>
+            <a:off x="838200" y="2690446"/>
+            <a:ext cx="9953625" cy="1424354"/>
           </a:xfrm>
           <a:prstGeom prst="rect">
             <a:avLst/>
@@ -2824,7 +2824,7 @@
         </p:nvSpPr>
         <p:spPr>
           <a:xfrm>
-            <a:off x="4128482" y="4378569"/>
+            <a:off x="4128482" y="4196862"/>
             <a:ext cx="3363912" cy="2384670"/>
           </a:xfrm>
           <a:prstGeom prst="rect">
@@ -2857,7 +2857,7 @@
         </p:nvSpPr>
         <p:spPr>
           <a:xfrm>
-            <a:off x="744298" y="4378569"/>
+            <a:off x="744298" y="4196862"/>
             <a:ext cx="3363912" cy="2384670"/>
           </a:xfrm>
           <a:prstGeom prst="rect">
@@ -2890,7 +2890,7 @@
         </p:nvSpPr>
         <p:spPr>
           <a:xfrm>
-            <a:off x="7512666" y="4378935"/>
+            <a:off x="7512666" y="4197228"/>
             <a:ext cx="3363911" cy="2373313"/>
           </a:xfrm>
           <a:prstGeom prst="rect">
@@ -2909,6 +2909,172 @@
     <p:extLst>
       <p:ext uri="{BB962C8B-B14F-4D97-AF65-F5344CB8AC3E}">
         <p14:creationId xmlns:p14="http://schemas.microsoft.com/office/powerpoint/2010/main" val="865130088"/>
+      </p:ext>
+    </p:extLst>
+  </p:cSld>
+  <p:clrMapOvr>
+    <a:masterClrMapping/>
+  </p:clrMapOvr>
+</p:sldLayout>
+</file>
+
+<file path=ppt/slideLayouts/slideLayout18.xml><?xml version="1.0" encoding="utf-8"?>
+<p:sldLayout xmlns:a="http://schemas.openxmlformats.org/drawingml/2006/main" xmlns:r="http://schemas.openxmlformats.org/officeDocument/2006/relationships" xmlns:p="http://schemas.openxmlformats.org/presentationml/2006/main" preserve="1" userDrawn="1">
+  <p:cSld name="Analytics_slide_Text&amp;picture">
+    <p:spTree>
+      <p:nvGrpSpPr>
+        <p:cNvPr id="1" name=""/>
+        <p:cNvGrpSpPr/>
+        <p:nvPr/>
+      </p:nvGrpSpPr>
+      <p:grpSpPr>
+        <a:xfrm>
+          <a:off x="0" y="0"/>
+          <a:ext cx="0" cy="0"/>
+          <a:chOff x="0" y="0"/>
+          <a:chExt cx="0" cy="0"/>
+        </a:xfrm>
+      </p:grpSpPr>
+      <p:sp>
+        <p:nvSpPr>
+          <p:cNvPr id="2" name="Title 1">
+            <a:extLst>
+              <a:ext uri="{FF2B5EF4-FFF2-40B4-BE49-F238E27FC236}">
+                <a16:creationId xmlns:a16="http://schemas.microsoft.com/office/drawing/2014/main" id="{80D116EC-7FB5-19E8-CADC-28258C644374}"/>
+              </a:ext>
+            </a:extLst>
+          </p:cNvPr>
+          <p:cNvSpPr>
+            <a:spLocks noGrp="1"/>
+          </p:cNvSpPr>
+          <p:nvPr>
+            <p:ph type="title"/>
+          </p:nvPr>
+        </p:nvSpPr>
+        <p:spPr>
+          <a:xfrm>
+            <a:off x="838200" y="365125"/>
+            <a:ext cx="10515600" cy="1325563"/>
+          </a:xfrm>
+          <a:prstGeom prst="rect">
+            <a:avLst/>
+          </a:prstGeom>
+        </p:spPr>
+        <p:txBody>
+          <a:bodyPr/>
+          <a:lstStyle/>
+          <a:p>
+            <a:r>
+              <a:rPr lang="en-US"/>
+              <a:t>Click to edit Master title style</a:t>
+            </a:r>
+            <a:endParaRPr lang="en-GB"/>
+          </a:p>
+        </p:txBody>
+      </p:sp>
+      <p:sp>
+        <p:nvSpPr>
+          <p:cNvPr id="4" name="Text Placeholder 3">
+            <a:extLst>
+              <a:ext uri="{FF2B5EF4-FFF2-40B4-BE49-F238E27FC236}">
+                <a16:creationId xmlns:a16="http://schemas.microsoft.com/office/drawing/2014/main" id="{E7FBC9AA-4903-19F0-C036-B82A87811CF5}"/>
+              </a:ext>
+            </a:extLst>
+          </p:cNvPr>
+          <p:cNvSpPr>
+            <a:spLocks noGrp="1"/>
+          </p:cNvSpPr>
+          <p:nvPr>
+            <p:ph type="body" sz="quarter" idx="10"/>
+          </p:nvPr>
+        </p:nvSpPr>
+        <p:spPr>
+          <a:xfrm>
+            <a:off x="838200" y="1793875"/>
+            <a:ext cx="10515600" cy="1910617"/>
+          </a:xfrm>
+          <a:prstGeom prst="rect">
+            <a:avLst/>
+          </a:prstGeom>
+        </p:spPr>
+        <p:txBody>
+          <a:bodyPr/>
+          <a:lstStyle/>
+          <a:p>
+            <a:pPr lvl="0"/>
+            <a:r>
+              <a:rPr lang="en-US" dirty="0"/>
+              <a:t>Click to edit Master text styles</a:t>
+            </a:r>
+          </a:p>
+          <a:p>
+            <a:pPr lvl="1"/>
+            <a:r>
+              <a:rPr lang="en-US" dirty="0"/>
+              <a:t>Second level</a:t>
+            </a:r>
+          </a:p>
+          <a:p>
+            <a:pPr lvl="2"/>
+            <a:r>
+              <a:rPr lang="en-US" dirty="0"/>
+              <a:t>Third level</a:t>
+            </a:r>
+          </a:p>
+          <a:p>
+            <a:pPr lvl="3"/>
+            <a:r>
+              <a:rPr lang="en-US" dirty="0"/>
+              <a:t>Fourth level</a:t>
+            </a:r>
+          </a:p>
+          <a:p>
+            <a:pPr lvl="4"/>
+            <a:r>
+              <a:rPr lang="en-US" dirty="0"/>
+              <a:t>Fifth level</a:t>
+            </a:r>
+            <a:endParaRPr lang="en-GB" dirty="0"/>
+          </a:p>
+        </p:txBody>
+      </p:sp>
+      <p:sp>
+        <p:nvSpPr>
+          <p:cNvPr id="6" name="Picture Placeholder 5">
+            <a:extLst>
+              <a:ext uri="{FF2B5EF4-FFF2-40B4-BE49-F238E27FC236}">
+                <a16:creationId xmlns:a16="http://schemas.microsoft.com/office/drawing/2014/main" id="{CFFA9B06-28B5-0AA9-889E-1EBC2DACA6A9}"/>
+              </a:ext>
+            </a:extLst>
+          </p:cNvPr>
+          <p:cNvSpPr>
+            <a:spLocks noGrp="1"/>
+          </p:cNvSpPr>
+          <p:nvPr>
+            <p:ph type="pic" sz="quarter" idx="11"/>
+          </p:nvPr>
+        </p:nvSpPr>
+        <p:spPr>
+          <a:xfrm>
+            <a:off x="838200" y="3807679"/>
+            <a:ext cx="10515600" cy="2932846"/>
+          </a:xfrm>
+          <a:prstGeom prst="rect">
+            <a:avLst/>
+          </a:prstGeom>
+        </p:spPr>
+        <p:txBody>
+          <a:bodyPr/>
+          <a:lstStyle/>
+          <a:p>
+            <a:endParaRPr lang="en-GB"/>
+          </a:p>
+        </p:txBody>
+      </p:sp>
+    </p:spTree>
+    <p:extLst>
+      <p:ext uri="{BB962C8B-B14F-4D97-AF65-F5344CB8AC3E}">
+        <p14:creationId xmlns:p14="http://schemas.microsoft.com/office/powerpoint/2010/main" val="747400368"/>
       </p:ext>
     </p:extLst>
   </p:cSld>
@@ -5769,13 +5935,13 @@
           <p:nvPr userDrawn="1"/>
         </p:nvPicPr>
         <p:blipFill>
-          <a:blip r:embed="rId13" cstate="print">
+          <a:blip r:embed="rId14" cstate="print">
             <a:extLst>
               <a:ext uri="{28A0092B-C50C-407E-A947-70E740481C1C}">
                 <a14:useLocalDpi xmlns:a14="http://schemas.microsoft.com/office/drawing/2010/main" val="0"/>
               </a:ext>
               <a:ext uri="{96DAC541-7B7A-43D3-8B79-37D633B846F1}">
-                <asvg:svgBlip xmlns:asvg="http://schemas.microsoft.com/office/drawing/2016/SVG/main" r:embed="rId14"/>
+                <asvg:svgBlip xmlns:asvg="http://schemas.microsoft.com/office/drawing/2016/SVG/main" r:embed="rId15"/>
               </a:ext>
             </a:extLst>
           </a:blip>
@@ -5813,6 +5979,7 @@
     <p:sldLayoutId id="2147483984" r:id="rId9"/>
     <p:sldLayoutId id="2147483986" r:id="rId10"/>
     <p:sldLayoutId id="2147483987" r:id="rId11"/>
+    <p:sldLayoutId id="2147483988" r:id="rId12"/>
   </p:sldLayoutIdLst>
   <p:hf hdr="0" ftr="0" dt="0"/>
   <p:txStyles>

</xml_diff>